<commit_message>
modified(Reports): modify Lab_Report 2021-11-26
</commit_message>
<xml_diff>
--- a/2021_Reports/Lab_Report/2021-11-26/2021-11-26.pptx
+++ b/2021_Reports/Lab_Report/2021-11-26/2021-11-26.pptx
@@ -48250,30 +48250,6 @@
           </a:graphicData>
         </a:graphic>
       </p:graphicFrame>
-      <p:pic>
-        <p:nvPicPr>
-          <p:cNvPr id="6" name="图片 5"/>
-          <p:cNvPicPr>
-            <a:picLocks noChangeAspect="1"/>
-          </p:cNvPicPr>
-          <p:nvPr/>
-        </p:nvPicPr>
-        <p:blipFill>
-          <a:blip r:embed="rId1"/>
-          <a:stretch>
-            <a:fillRect/>
-          </a:stretch>
-        </p:blipFill>
-        <p:spPr>
-          <a:xfrm>
-            <a:off x="6343650" y="1494790"/>
-            <a:ext cx="5848350" cy="2038350"/>
-          </a:xfrm>
-          <a:prstGeom prst="rect">
-            <a:avLst/>
-          </a:prstGeom>
-        </p:spPr>
-      </p:pic>
     </p:spTree>
   </p:cSld>
   <p:clrMapOvr>
@@ -48282,159 +48258,7 @@
   <p:timing>
     <p:tnLst>
       <p:par>
-        <p:cTn id="1" dur="indefinite" restart="never" nodeType="tmRoot">
-          <p:childTnLst>
-            <p:seq concurrent="1" nextAc="seek">
-              <p:cTn id="2" dur="indefinite" nodeType="mainSeq">
-                <p:childTnLst>
-                  <p:par>
-                    <p:cTn id="3" fill="hold">
-                      <p:stCondLst>
-                        <p:cond delay="indefinite"/>
-                      </p:stCondLst>
-                      <p:childTnLst>
-                        <p:par>
-                          <p:cTn id="4" fill="hold">
-                            <p:stCondLst>
-                              <p:cond delay="0"/>
-                            </p:stCondLst>
-                            <p:childTnLst>
-                              <p:par>
-                                <p:cTn id="5" presetID="22" presetClass="entr" presetSubtype="4" fill="hold" nodeType="clickEffect">
-                                  <p:stCondLst>
-                                    <p:cond delay="0"/>
-                                  </p:stCondLst>
-                                  <p:childTnLst>
-                                    <p:set>
-                                      <p:cBhvr>
-                                        <p:cTn id="6" dur="1" fill="hold">
-                                          <p:stCondLst>
-                                            <p:cond delay="0"/>
-                                          </p:stCondLst>
-                                        </p:cTn>
-                                        <p:tgtEl>
-                                          <p:spTgt spid="6"/>
-                                        </p:tgtEl>
-                                        <p:attrNameLst>
-                                          <p:attrName>style.visibility</p:attrName>
-                                        </p:attrNameLst>
-                                      </p:cBhvr>
-                                      <p:to>
-                                        <p:strVal val="visible"/>
-                                      </p:to>
-                                    </p:set>
-                                    <p:animEffect transition="in" filter="wipe(down)">
-                                      <p:cBhvr>
-                                        <p:cTn id="7" dur="500"/>
-                                        <p:tgtEl>
-                                          <p:spTgt spid="6"/>
-                                        </p:tgtEl>
-                                      </p:cBhvr>
-                                    </p:animEffect>
-                                  </p:childTnLst>
-                                </p:cTn>
-                              </p:par>
-                            </p:childTnLst>
-                          </p:cTn>
-                        </p:par>
-                      </p:childTnLst>
-                    </p:cTn>
-                  </p:par>
-                  <p:par>
-                    <p:cTn id="8" fill="hold">
-                      <p:stCondLst>
-                        <p:cond delay="indefinite"/>
-                      </p:stCondLst>
-                      <p:childTnLst>
-                        <p:par>
-                          <p:cTn id="9" fill="hold">
-                            <p:stCondLst>
-                              <p:cond delay="0"/>
-                            </p:stCondLst>
-                            <p:childTnLst>
-                              <p:par>
-                                <p:cTn id="10" presetID="12" presetClass="exit" presetSubtype="4" fill="hold" nodeType="clickEffect">
-                                  <p:stCondLst>
-                                    <p:cond delay="0"/>
-                                  </p:stCondLst>
-                                  <p:childTnLst>
-                                    <p:anim calcmode="lin" valueType="num">
-                                      <p:cBhvr additive="base">
-                                        <p:cTn id="11" dur="500"/>
-                                        <p:tgtEl>
-                                          <p:spTgt spid="6"/>
-                                        </p:tgtEl>
-                                        <p:attrNameLst>
-                                          <p:attrName>ppt_y</p:attrName>
-                                        </p:attrNameLst>
-                                      </p:cBhvr>
-                                      <p:tavLst>
-                                        <p:tav tm="0">
-                                          <p:val>
-                                            <p:strVal val="#ppt_y"/>
-                                          </p:val>
-                                        </p:tav>
-                                        <p:tav tm="100000">
-                                          <p:val>
-                                            <p:strVal val="#ppt_y+#ppt_h*1.125000"/>
-                                          </p:val>
-                                        </p:tav>
-                                      </p:tavLst>
-                                    </p:anim>
-                                    <p:animEffect transition="out" filter="wipe(down)">
-                                      <p:cBhvr>
-                                        <p:cTn id="12" dur="500"/>
-                                        <p:tgtEl>
-                                          <p:spTgt spid="6"/>
-                                        </p:tgtEl>
-                                      </p:cBhvr>
-                                    </p:animEffect>
-                                    <p:set>
-                                      <p:cBhvr>
-                                        <p:cTn id="13" dur="1" fill="hold">
-                                          <p:stCondLst>
-                                            <p:cond delay="499"/>
-                                          </p:stCondLst>
-                                        </p:cTn>
-                                        <p:tgtEl>
-                                          <p:spTgt spid="6"/>
-                                        </p:tgtEl>
-                                        <p:attrNameLst>
-                                          <p:attrName>style.visibility</p:attrName>
-                                        </p:attrNameLst>
-                                      </p:cBhvr>
-                                      <p:to>
-                                        <p:strVal val="hidden"/>
-                                      </p:to>
-                                    </p:set>
-                                  </p:childTnLst>
-                                </p:cTn>
-                              </p:par>
-                            </p:childTnLst>
-                          </p:cTn>
-                        </p:par>
-                      </p:childTnLst>
-                    </p:cTn>
-                  </p:par>
-                </p:childTnLst>
-              </p:cTn>
-              <p:prevCondLst>
-                <p:cond evt="onPrev" delay="0">
-                  <p:tgtEl>
-                    <p:sldTgt/>
-                  </p:tgtEl>
-                </p:cond>
-              </p:prevCondLst>
-              <p:nextCondLst>
-                <p:cond evt="onNext" delay="0">
-                  <p:tgtEl>
-                    <p:sldTgt/>
-                  </p:tgtEl>
-                </p:cond>
-              </p:nextCondLst>
-            </p:seq>
-          </p:childTnLst>
-        </p:cTn>
+        <p:cTn id="1" dur="indefinite" restart="never" nodeType="tmRoot"/>
       </p:par>
     </p:tnLst>
   </p:timing>

</xml_diff>